<commit_message>
Updated Syllabus and Slides for Week 1
Changed submission policy + Slides for Week 1
</commit_message>
<xml_diff>
--- a/2_Slides_Literature/2_Basics of Political Psychology/2-Methoden und Theorien der politischen Psychologie.pptx
+++ b/2_Slides_Literature/2_Basics of Political Psychology/2-Methoden und Theorien der politischen Psychologie.pptx
@@ -5,10 +5,10 @@
     <p:sldMasterId id="2147483678" r:id="rId1"/>
   </p:sldMasterIdLst>
   <p:notesMasterIdLst>
-    <p:notesMasterId r:id="rId26"/>
+    <p:notesMasterId r:id="rId30"/>
   </p:notesMasterIdLst>
   <p:handoutMasterIdLst>
-    <p:handoutMasterId r:id="rId27"/>
+    <p:handoutMasterId r:id="rId31"/>
   </p:handoutMasterIdLst>
   <p:sldIdLst>
     <p:sldId id="256" r:id="rId2"/>
@@ -31,10 +31,14 @@
     <p:sldId id="275" r:id="rId19"/>
     <p:sldId id="277" r:id="rId20"/>
     <p:sldId id="278" r:id="rId21"/>
-    <p:sldId id="280" r:id="rId22"/>
-    <p:sldId id="279" r:id="rId23"/>
-    <p:sldId id="262" r:id="rId24"/>
-    <p:sldId id="281" r:id="rId25"/>
+    <p:sldId id="285" r:id="rId22"/>
+    <p:sldId id="280" r:id="rId23"/>
+    <p:sldId id="279" r:id="rId24"/>
+    <p:sldId id="262" r:id="rId25"/>
+    <p:sldId id="281" r:id="rId26"/>
+    <p:sldId id="401" r:id="rId27"/>
+    <p:sldId id="416" r:id="rId28"/>
+    <p:sldId id="393" r:id="rId29"/>
   </p:sldIdLst>
   <p:sldSz cx="9144000" cy="5143500" type="screen16x9"/>
   <p:notesSz cx="6819900" cy="9918700"/>
@@ -200,7 +204,7 @@
 <file path=ppt/revisionInfo.xml><?xml version="1.0" encoding="utf-8"?>
 <p1510:revInfo xmlns:a="http://schemas.openxmlformats.org/drawingml/2006/main" xmlns:r="http://schemas.openxmlformats.org/officeDocument/2006/relationships" xmlns:p1510="http://schemas.microsoft.com/office/powerpoint/2015/10/main">
   <p1510:revLst>
-    <p1510:client id="{A850E4B7-99CD-44F4-B4C5-5379AEBC3A31}" v="127" dt="2022-05-02T14:12:18.681"/>
+    <p1510:client id="{E94AFAF3-9327-44B5-A633-24733238964D}" v="92" dt="2023-04-14T07:52:15.874"/>
   </p1510:revLst>
 </p1510:revInfo>
 </file>
@@ -2746,7 +2750,7 @@
           <pc:sldLayoutMkLst>
             <pc:docMk/>
             <pc:sldMasterMk cId="0" sldId="2147483678"/>
-            <pc:sldLayoutMk cId="0" sldId="2147483695"/>
+            <pc:sldLayoutMk cId="280571401" sldId="2147483695"/>
           </pc:sldLayoutMkLst>
         </pc:sldLayoutChg>
         <pc:sldLayoutChg chg="del">
@@ -4929,6 +4933,197 @@
         <pc:sldMkLst>
           <pc:docMk/>
           <pc:sldMk cId="2715604998" sldId="281"/>
+        </pc:sldMkLst>
+      </pc:sldChg>
+    </pc:docChg>
+  </pc:docChgLst>
+  <pc:docChgLst>
+    <pc:chgData name="C C" userId="58c016da926720ee" providerId="LiveId" clId="{E94AFAF3-9327-44B5-A633-24733238964D}"/>
+    <pc:docChg chg="custSel addSld delSld modSld sldOrd">
+      <pc:chgData name="C C" userId="58c016da926720ee" providerId="LiveId" clId="{E94AFAF3-9327-44B5-A633-24733238964D}" dt="2023-04-14T07:52:15.873" v="542"/>
+      <pc:docMkLst>
+        <pc:docMk/>
+      </pc:docMkLst>
+      <pc:sldChg chg="addSp delSp modSp mod">
+        <pc:chgData name="C C" userId="58c016da926720ee" providerId="LiveId" clId="{E94AFAF3-9327-44B5-A633-24733238964D}" dt="2023-04-14T07:44:02.916" v="499" actId="478"/>
+        <pc:sldMkLst>
+          <pc:docMk/>
+          <pc:sldMk cId="3515141526" sldId="262"/>
+        </pc:sldMkLst>
+        <pc:spChg chg="add mod">
+          <ac:chgData name="C C" userId="58c016da926720ee" providerId="LiveId" clId="{E94AFAF3-9327-44B5-A633-24733238964D}" dt="2023-04-14T07:44:02.916" v="499" actId="478"/>
+          <ac:spMkLst>
+            <pc:docMk/>
+            <pc:sldMk cId="3515141526" sldId="262"/>
+            <ac:spMk id="5" creationId="{DBA7B89F-38B8-431E-E7B4-FE69D218D397}"/>
+          </ac:spMkLst>
+        </pc:spChg>
+        <pc:picChg chg="del">
+          <ac:chgData name="C C" userId="58c016da926720ee" providerId="LiveId" clId="{E94AFAF3-9327-44B5-A633-24733238964D}" dt="2023-04-14T07:44:02.916" v="499" actId="478"/>
+          <ac:picMkLst>
+            <pc:docMk/>
+            <pc:sldMk cId="3515141526" sldId="262"/>
+            <ac:picMk id="10" creationId="{59185352-D51E-4AEB-875F-C203288AAEA8}"/>
+          </ac:picMkLst>
+        </pc:picChg>
+      </pc:sldChg>
+      <pc:sldChg chg="modSp mod">
+        <pc:chgData name="C C" userId="58c016da926720ee" providerId="LiveId" clId="{E94AFAF3-9327-44B5-A633-24733238964D}" dt="2023-04-14T07:39:33.825" v="35" actId="20577"/>
+        <pc:sldMkLst>
+          <pc:docMk/>
+          <pc:sldMk cId="2073477038" sldId="277"/>
+        </pc:sldMkLst>
+        <pc:spChg chg="mod">
+          <ac:chgData name="C C" userId="58c016da926720ee" providerId="LiveId" clId="{E94AFAF3-9327-44B5-A633-24733238964D}" dt="2023-04-14T07:39:33.825" v="35" actId="20577"/>
+          <ac:spMkLst>
+            <pc:docMk/>
+            <pc:sldMk cId="2073477038" sldId="277"/>
+            <ac:spMk id="2" creationId="{C9DC46A7-B86A-4403-BBB4-5383DC25C581}"/>
+          </ac:spMkLst>
+        </pc:spChg>
+      </pc:sldChg>
+      <pc:sldChg chg="modSp mod">
+        <pc:chgData name="C C" userId="58c016da926720ee" providerId="LiveId" clId="{E94AFAF3-9327-44B5-A633-24733238964D}" dt="2023-04-14T07:39:27.617" v="25" actId="20577"/>
+        <pc:sldMkLst>
+          <pc:docMk/>
+          <pc:sldMk cId="911192258" sldId="278"/>
+        </pc:sldMkLst>
+        <pc:spChg chg="mod">
+          <ac:chgData name="C C" userId="58c016da926720ee" providerId="LiveId" clId="{E94AFAF3-9327-44B5-A633-24733238964D}" dt="2023-04-14T07:39:27.617" v="25" actId="20577"/>
+          <ac:spMkLst>
+            <pc:docMk/>
+            <pc:sldMk cId="911192258" sldId="278"/>
+            <ac:spMk id="5" creationId="{385008BE-1668-4B22-A439-090A62E70F9B}"/>
+          </ac:spMkLst>
+        </pc:spChg>
+      </pc:sldChg>
+      <pc:sldChg chg="modSp mod">
+        <pc:chgData name="C C" userId="58c016da926720ee" providerId="LiveId" clId="{E94AFAF3-9327-44B5-A633-24733238964D}" dt="2023-04-14T07:43:44.829" v="498" actId="20577"/>
+        <pc:sldMkLst>
+          <pc:docMk/>
+          <pc:sldMk cId="2106003604" sldId="281"/>
+        </pc:sldMkLst>
+        <pc:graphicFrameChg chg="modGraphic">
+          <ac:chgData name="C C" userId="58c016da926720ee" providerId="LiveId" clId="{E94AFAF3-9327-44B5-A633-24733238964D}" dt="2023-04-14T07:43:44.829" v="498" actId="20577"/>
+          <ac:graphicFrameMkLst>
+            <pc:docMk/>
+            <pc:sldMk cId="2106003604" sldId="281"/>
+            <ac:graphicFrameMk id="5" creationId="{699C6084-5148-4AC2-A172-C137D767035C}"/>
+          </ac:graphicFrameMkLst>
+        </pc:graphicFrameChg>
+      </pc:sldChg>
+      <pc:sldChg chg="modSp new del mod">
+        <pc:chgData name="C C" userId="58c016da926720ee" providerId="LiveId" clId="{E94AFAF3-9327-44B5-A633-24733238964D}" dt="2023-04-14T07:39:57.406" v="71" actId="47"/>
+        <pc:sldMkLst>
+          <pc:docMk/>
+          <pc:sldMk cId="3203536707" sldId="283"/>
+        </pc:sldMkLst>
+        <pc:spChg chg="mod">
+          <ac:chgData name="C C" userId="58c016da926720ee" providerId="LiveId" clId="{E94AFAF3-9327-44B5-A633-24733238964D}" dt="2023-04-14T07:39:04.362" v="3" actId="20577"/>
+          <ac:spMkLst>
+            <pc:docMk/>
+            <pc:sldMk cId="3203536707" sldId="283"/>
+            <ac:spMk id="2" creationId="{0300FB61-B755-0058-ED91-17773CC935E4}"/>
+          </ac:spMkLst>
+        </pc:spChg>
+      </pc:sldChg>
+      <pc:sldChg chg="addSp delSp modSp add del mod ord delAnim modAnim">
+        <pc:chgData name="C C" userId="58c016da926720ee" providerId="LiveId" clId="{E94AFAF3-9327-44B5-A633-24733238964D}" dt="2023-04-14T07:41:07.660" v="161" actId="47"/>
+        <pc:sldMkLst>
+          <pc:docMk/>
+          <pc:sldMk cId="895943528" sldId="284"/>
+        </pc:sldMkLst>
+        <pc:spChg chg="mod">
+          <ac:chgData name="C C" userId="58c016da926720ee" providerId="LiveId" clId="{E94AFAF3-9327-44B5-A633-24733238964D}" dt="2023-04-14T07:39:43.053" v="67" actId="20577"/>
+          <ac:spMkLst>
+            <pc:docMk/>
+            <pc:sldMk cId="895943528" sldId="284"/>
+            <ac:spMk id="2" creationId="{C9DC46A7-B86A-4403-BBB4-5383DC25C581}"/>
+          </ac:spMkLst>
+        </pc:spChg>
+        <pc:spChg chg="del mod">
+          <ac:chgData name="C C" userId="58c016da926720ee" providerId="LiveId" clId="{E94AFAF3-9327-44B5-A633-24733238964D}" dt="2023-04-14T07:41:04.478" v="160" actId="478"/>
+          <ac:spMkLst>
+            <pc:docMk/>
+            <pc:sldMk cId="895943528" sldId="284"/>
+            <ac:spMk id="3" creationId="{E0789754-DB61-49BB-8E9D-96ACFA633A8F}"/>
+          </ac:spMkLst>
+        </pc:spChg>
+        <pc:spChg chg="add del mod">
+          <ac:chgData name="C C" userId="58c016da926720ee" providerId="LiveId" clId="{E94AFAF3-9327-44B5-A633-24733238964D}" dt="2023-04-14T07:39:50.302" v="69" actId="478"/>
+          <ac:spMkLst>
+            <pc:docMk/>
+            <pc:sldMk cId="895943528" sldId="284"/>
+            <ac:spMk id="6" creationId="{F02EAA81-2112-E1BD-B904-DAEE8DFF5728}"/>
+          </ac:spMkLst>
+        </pc:spChg>
+        <pc:spChg chg="add mod">
+          <ac:chgData name="C C" userId="58c016da926720ee" providerId="LiveId" clId="{E94AFAF3-9327-44B5-A633-24733238964D}" dt="2023-04-14T07:41:04.478" v="160" actId="478"/>
+          <ac:spMkLst>
+            <pc:docMk/>
+            <pc:sldMk cId="895943528" sldId="284"/>
+            <ac:spMk id="8" creationId="{E4C0ED8F-0446-89FD-893F-E713C0EA4807}"/>
+          </ac:spMkLst>
+        </pc:spChg>
+        <pc:picChg chg="del">
+          <ac:chgData name="C C" userId="58c016da926720ee" providerId="LiveId" clId="{E94AFAF3-9327-44B5-A633-24733238964D}" dt="2023-04-14T07:39:47.720" v="68" actId="478"/>
+          <ac:picMkLst>
+            <pc:docMk/>
+            <pc:sldMk cId="895943528" sldId="284"/>
+            <ac:picMk id="5" creationId="{F548DD8E-D2F0-4C93-8DDE-56B550B29649}"/>
+          </ac:picMkLst>
+        </pc:picChg>
+      </pc:sldChg>
+      <pc:sldChg chg="addSp modSp add mod">
+        <pc:chgData name="C C" userId="58c016da926720ee" providerId="LiveId" clId="{E94AFAF3-9327-44B5-A633-24733238964D}" dt="2023-04-14T07:49:45.372" v="540" actId="1076"/>
+        <pc:sldMkLst>
+          <pc:docMk/>
+          <pc:sldMk cId="3891049118" sldId="285"/>
+        </pc:sldMkLst>
+        <pc:spChg chg="mod">
+          <ac:chgData name="C C" userId="58c016da926720ee" providerId="LiveId" clId="{E94AFAF3-9327-44B5-A633-24733238964D}" dt="2023-04-14T07:41:14.329" v="193" actId="20577"/>
+          <ac:spMkLst>
+            <pc:docMk/>
+            <pc:sldMk cId="3891049118" sldId="285"/>
+            <ac:spMk id="5" creationId="{385008BE-1668-4B22-A439-090A62E70F9B}"/>
+          </ac:spMkLst>
+        </pc:spChg>
+        <pc:spChg chg="mod">
+          <ac:chgData name="C C" userId="58c016da926720ee" providerId="LiveId" clId="{E94AFAF3-9327-44B5-A633-24733238964D}" dt="2023-04-14T07:49:38.552" v="537" actId="14100"/>
+          <ac:spMkLst>
+            <pc:docMk/>
+            <pc:sldMk cId="3891049118" sldId="285"/>
+            <ac:spMk id="7" creationId="{20C1611D-16DD-48E3-8356-718FF42382B4}"/>
+          </ac:spMkLst>
+        </pc:spChg>
+        <pc:picChg chg="add mod">
+          <ac:chgData name="C C" userId="58c016da926720ee" providerId="LiveId" clId="{E94AFAF3-9327-44B5-A633-24733238964D}" dt="2023-04-14T07:49:45.372" v="540" actId="1076"/>
+          <ac:picMkLst>
+            <pc:docMk/>
+            <pc:sldMk cId="3891049118" sldId="285"/>
+            <ac:picMk id="1026" creationId="{F4E3C064-B307-C2D8-3435-810E5F638D73}"/>
+          </ac:picMkLst>
+        </pc:picChg>
+      </pc:sldChg>
+      <pc:sldChg chg="add">
+        <pc:chgData name="C C" userId="58c016da926720ee" providerId="LiveId" clId="{E94AFAF3-9327-44B5-A633-24733238964D}" dt="2023-04-14T07:52:15.873" v="542"/>
+        <pc:sldMkLst>
+          <pc:docMk/>
+          <pc:sldMk cId="3393580242" sldId="393"/>
+        </pc:sldMkLst>
+      </pc:sldChg>
+      <pc:sldChg chg="add">
+        <pc:chgData name="C C" userId="58c016da926720ee" providerId="LiveId" clId="{E94AFAF3-9327-44B5-A633-24733238964D}" dt="2023-04-14T07:52:03.431" v="541"/>
+        <pc:sldMkLst>
+          <pc:docMk/>
+          <pc:sldMk cId="937996676" sldId="401"/>
+        </pc:sldMkLst>
+      </pc:sldChg>
+      <pc:sldChg chg="add">
+        <pc:chgData name="C C" userId="58c016da926720ee" providerId="LiveId" clId="{E94AFAF3-9327-44B5-A633-24733238964D}" dt="2023-04-14T07:52:03.431" v="541"/>
+        <pc:sldMkLst>
+          <pc:docMk/>
+          <pc:sldMk cId="1978773447" sldId="416"/>
         </pc:sldMkLst>
       </pc:sldChg>
     </pc:docChg>
@@ -7973,6 +8168,139 @@
 </p:sldLayout>
 </file>
 
+<file path=ppt/slideLayouts/slideLayout7.xml><?xml version="1.0" encoding="utf-8"?>
+<p:sldLayout xmlns:a="http://schemas.openxmlformats.org/drawingml/2006/main" xmlns:r="http://schemas.openxmlformats.org/officeDocument/2006/relationships" xmlns:p="http://schemas.openxmlformats.org/presentationml/2006/main" type="obj">
+  <p:cSld name="Titel und Inhalt">
+    <p:spTree>
+      <p:nvGrpSpPr>
+        <p:cNvPr id="1" name=""/>
+        <p:cNvGrpSpPr/>
+        <p:nvPr/>
+      </p:nvGrpSpPr>
+      <p:grpSpPr>
+        <a:xfrm>
+          <a:off x="0" y="0"/>
+          <a:ext cx="0" cy="0"/>
+          <a:chOff x="0" y="0"/>
+          <a:chExt cx="0" cy="0"/>
+        </a:xfrm>
+      </p:grpSpPr>
+      <p:sp>
+        <p:nvSpPr>
+          <p:cNvPr id="2" name="Titel 1"/>
+          <p:cNvSpPr>
+            <a:spLocks noGrp="1"/>
+          </p:cNvSpPr>
+          <p:nvPr>
+            <p:ph type="title"/>
+          </p:nvPr>
+        </p:nvSpPr>
+        <p:spPr/>
+        <p:txBody>
+          <a:bodyPr/>
+          <a:lstStyle/>
+          <a:p>
+            <a:r>
+              <a:rPr lang="de-DE"/>
+              <a:t>Titelmasterformat durch Klicken bearbeiten</a:t>
+            </a:r>
+          </a:p>
+        </p:txBody>
+      </p:sp>
+      <p:sp>
+        <p:nvSpPr>
+          <p:cNvPr id="3" name="Inhaltsplatzhalter 2"/>
+          <p:cNvSpPr>
+            <a:spLocks noGrp="1"/>
+          </p:cNvSpPr>
+          <p:nvPr>
+            <p:ph idx="1"/>
+          </p:nvPr>
+        </p:nvSpPr>
+        <p:spPr/>
+        <p:txBody>
+          <a:bodyPr/>
+          <a:lstStyle/>
+          <a:p>
+            <a:pPr lvl="0"/>
+            <a:r>
+              <a:rPr lang="de-DE"/>
+              <a:t>Textmasterformat bearbeiten</a:t>
+            </a:r>
+          </a:p>
+          <a:p>
+            <a:pPr lvl="1"/>
+            <a:r>
+              <a:rPr lang="de-DE"/>
+              <a:t>Zweite Ebene</a:t>
+            </a:r>
+          </a:p>
+          <a:p>
+            <a:pPr lvl="2"/>
+            <a:r>
+              <a:rPr lang="de-DE"/>
+              <a:t>Dritte Ebene</a:t>
+            </a:r>
+          </a:p>
+          <a:p>
+            <a:pPr lvl="3"/>
+            <a:r>
+              <a:rPr lang="de-DE"/>
+              <a:t>Vierte Ebene</a:t>
+            </a:r>
+          </a:p>
+          <a:p>
+            <a:pPr lvl="4"/>
+            <a:r>
+              <a:rPr lang="de-DE"/>
+              <a:t>Fünfte Ebene</a:t>
+            </a:r>
+          </a:p>
+        </p:txBody>
+      </p:sp>
+      <p:sp>
+        <p:nvSpPr>
+          <p:cNvPr id="4" name="Rectangle 8"/>
+          <p:cNvSpPr>
+            <a:spLocks noGrp="1" noChangeArrowheads="1"/>
+          </p:cNvSpPr>
+          <p:nvPr>
+            <p:ph type="ftr" sz="quarter" idx="10"/>
+          </p:nvPr>
+        </p:nvSpPr>
+        <p:spPr/>
+        <p:txBody>
+          <a:bodyPr/>
+          <a:lstStyle>
+            <a:lvl1pPr>
+              <a:defRPr/>
+            </a:lvl1pPr>
+          </a:lstStyle>
+          <a:p>
+            <a:pPr>
+              <a:defRPr/>
+            </a:pPr>
+            <a:r>
+              <a:rPr lang="de-DE"/>
+              <a:t>Titel, Datum</a:t>
+            </a:r>
+          </a:p>
+        </p:txBody>
+      </p:sp>
+    </p:spTree>
+    <p:extLst>
+      <p:ext uri="{BB962C8B-B14F-4D97-AF65-F5344CB8AC3E}">
+        <p14:creationId xmlns:p14="http://schemas.microsoft.com/office/powerpoint/2010/main" val="1651845141"/>
+      </p:ext>
+    </p:extLst>
+  </p:cSld>
+  <p:clrMapOvr>
+    <a:masterClrMapping/>
+  </p:clrMapOvr>
+  <p:transition spd="slow"/>
+</p:sldLayout>
+</file>
+
 <file path=ppt/slideMasters/slideMaster1.xml><?xml version="1.0" encoding="utf-8"?>
 <p:sldMaster xmlns:a="http://schemas.openxmlformats.org/drawingml/2006/main" xmlns:r="http://schemas.openxmlformats.org/officeDocument/2006/relationships" xmlns:p="http://schemas.openxmlformats.org/presentationml/2006/main" preserve="1">
   <p:cSld>
@@ -8145,7 +8473,7 @@
           <p:nvPr userDrawn="1"/>
         </p:nvPicPr>
         <p:blipFill>
-          <a:blip r:embed="rId8" cstate="print"/>
+          <a:blip r:embed="rId9" cstate="print"/>
           <a:srcRect/>
           <a:stretch>
             <a:fillRect/>
@@ -8224,6 +8552,7 @@
     <p:sldLayoutId id="2147483691" r:id="rId4"/>
     <p:sldLayoutId id="2147483692" r:id="rId5"/>
     <p:sldLayoutId id="2147483695" r:id="rId6"/>
+    <p:sldLayoutId id="2147483696" r:id="rId7"/>
   </p:sldLayoutIdLst>
   <p:transition spd="slow"/>
   <p:hf sldNum="0" hdr="0" dt="0"/>
@@ -10906,8 +11235,12 @@
           <a:lstStyle/>
           <a:p>
             <a:r>
+              <a:rPr lang="en-US" dirty="0" err="1"/>
+              <a:t>Daten</a:t>
+            </a:r>
+            <a:r>
               <a:rPr lang="en-US" dirty="0"/>
-              <a:t>BUA Project Background</a:t>
+              <a:t> 1: BUA Project</a:t>
             </a:r>
           </a:p>
         </p:txBody>
@@ -11436,7 +11769,7 @@
           <a:p>
             <a:r>
               <a:rPr lang="de-DE" dirty="0"/>
-              <a:t>Eckdaten</a:t>
+              <a:t>Daten 1: BUA</a:t>
             </a:r>
           </a:p>
         </p:txBody>
@@ -11576,6 +11909,242 @@
 </file>
 
 <file path=ppt/slides/slide21.xml><?xml version="1.0" encoding="utf-8"?>
+<p:sld xmlns:a="http://schemas.openxmlformats.org/drawingml/2006/main" xmlns:r="http://schemas.openxmlformats.org/officeDocument/2006/relationships" xmlns:p="http://schemas.openxmlformats.org/presentationml/2006/main">
+  <p:cSld>
+    <p:spTree>
+      <p:nvGrpSpPr>
+        <p:cNvPr id="1" name=""/>
+        <p:cNvGrpSpPr/>
+        <p:nvPr/>
+      </p:nvGrpSpPr>
+      <p:grpSpPr>
+        <a:xfrm>
+          <a:off x="0" y="0"/>
+          <a:ext cx="0" cy="0"/>
+          <a:chOff x="0" y="0"/>
+          <a:chExt cx="0" cy="0"/>
+        </a:xfrm>
+      </p:grpSpPr>
+      <p:sp>
+        <p:nvSpPr>
+          <p:cNvPr id="5" name="Title 4">
+            <a:extLst>
+              <a:ext uri="{FF2B5EF4-FFF2-40B4-BE49-F238E27FC236}">
+                <a16:creationId xmlns:a16="http://schemas.microsoft.com/office/drawing/2014/main" id="{385008BE-1668-4B22-A439-090A62E70F9B}"/>
+              </a:ext>
+            </a:extLst>
+          </p:cNvPr>
+          <p:cNvSpPr>
+            <a:spLocks noGrp="1"/>
+          </p:cNvSpPr>
+          <p:nvPr>
+            <p:ph type="title"/>
+          </p:nvPr>
+        </p:nvSpPr>
+        <p:spPr/>
+        <p:txBody>
+          <a:bodyPr/>
+          <a:lstStyle/>
+          <a:p>
+            <a:r>
+              <a:rPr lang="de-DE" dirty="0"/>
+              <a:t>Daten 2: European </a:t>
+            </a:r>
+            <a:r>
+              <a:rPr lang="de-DE" dirty="0" err="1"/>
+              <a:t>Social</a:t>
+            </a:r>
+            <a:r>
+              <a:rPr lang="de-DE" dirty="0"/>
+              <a:t> Survey</a:t>
+            </a:r>
+          </a:p>
+        </p:txBody>
+      </p:sp>
+      <p:sp>
+        <p:nvSpPr>
+          <p:cNvPr id="7" name="Content Placeholder 6">
+            <a:extLst>
+              <a:ext uri="{FF2B5EF4-FFF2-40B4-BE49-F238E27FC236}">
+                <a16:creationId xmlns:a16="http://schemas.microsoft.com/office/drawing/2014/main" id="{20C1611D-16DD-48E3-8356-718FF42382B4}"/>
+              </a:ext>
+            </a:extLst>
+          </p:cNvPr>
+          <p:cNvSpPr>
+            <a:spLocks noGrp="1"/>
+          </p:cNvSpPr>
+          <p:nvPr>
+            <p:ph sz="quarter" idx="12"/>
+          </p:nvPr>
+        </p:nvSpPr>
+        <p:spPr/>
+        <p:txBody>
+          <a:bodyPr/>
+          <a:lstStyle/>
+          <a:p>
+            <a:pPr marL="342900" indent="-342900">
+              <a:buFont typeface="Arial" panose="020B0604020202020204" pitchFamily="34" charset="0"/>
+              <a:buChar char="•"/>
+            </a:pPr>
+            <a:r>
+              <a:rPr lang="de-DE" dirty="0"/>
+              <a:t>Erhebungszeitraum</a:t>
+            </a:r>
+          </a:p>
+          <a:p>
+            <a:pPr marL="698500" lvl="1" indent="-342900"/>
+            <a:r>
+              <a:rPr lang="de-DE" sz="1800" dirty="0"/>
+              <a:t>Welle 1: 2002 </a:t>
+            </a:r>
+          </a:p>
+          <a:p>
+            <a:pPr marL="698500" lvl="1" indent="-342900"/>
+            <a:r>
+              <a:rPr lang="de-DE" sz="1800" dirty="0"/>
+              <a:t>Welle 10: 2020 </a:t>
+            </a:r>
+          </a:p>
+          <a:p>
+            <a:pPr marL="698500" lvl="1" indent="-342900"/>
+            <a:r>
+              <a:rPr lang="de-DE" sz="1800" dirty="0"/>
+              <a:t>Erhebung alle zwei Jahre</a:t>
+            </a:r>
+          </a:p>
+          <a:p>
+            <a:pPr marL="342900" indent="-342900">
+              <a:buFont typeface="Arial" panose="020B0604020202020204" pitchFamily="34" charset="0"/>
+              <a:buChar char="•"/>
+            </a:pPr>
+            <a:r>
+              <a:rPr lang="de-DE" dirty="0"/>
+              <a:t>Konzepte im Fragebogen</a:t>
+            </a:r>
+          </a:p>
+          <a:p>
+            <a:pPr marL="698500" lvl="1" indent="-342900"/>
+            <a:r>
+              <a:rPr lang="de-DE" sz="1800" dirty="0"/>
+              <a:t>Sozialpolitische &amp; Politikwissenschaftliche Standarditems</a:t>
+            </a:r>
+          </a:p>
+          <a:p>
+            <a:pPr marL="698500" lvl="1" indent="-342900"/>
+            <a:r>
+              <a:rPr lang="de-DE" sz="1800" dirty="0"/>
+              <a:t>Werte, Ideologie und Parteienaffinität </a:t>
+            </a:r>
+          </a:p>
+          <a:p>
+            <a:pPr marL="698500" lvl="1" indent="-342900"/>
+            <a:r>
+              <a:rPr lang="de-DE" sz="1800" dirty="0"/>
+              <a:t>Gruppenzugehörigkeit und Gruppenwahrnehmungen </a:t>
+            </a:r>
+          </a:p>
+          <a:p>
+            <a:pPr marL="698500" lvl="1" indent="-342900"/>
+            <a:r>
+              <a:rPr lang="de-DE" sz="1800" dirty="0"/>
+              <a:t>Rotierende Wellen zu unterschiedlichen Themen </a:t>
+            </a:r>
+          </a:p>
+          <a:p>
+            <a:pPr marL="342900" indent="-342900">
+              <a:buFont typeface="Arial" panose="020B0604020202020204" pitchFamily="34" charset="0"/>
+              <a:buChar char="•"/>
+            </a:pPr>
+            <a:r>
+              <a:rPr lang="de-DE" dirty="0"/>
+              <a:t>Stratifiziertes Random Sample,  Querschnittsdaten</a:t>
+            </a:r>
+          </a:p>
+          <a:p>
+            <a:pPr marL="342900" indent="-342900">
+              <a:buFont typeface="Arial" panose="020B0604020202020204" pitchFamily="34" charset="0"/>
+              <a:buChar char="•"/>
+            </a:pPr>
+            <a:r>
+              <a:rPr lang="de-DE" dirty="0"/>
+              <a:t>Sehr hohe Datenqualität </a:t>
+            </a:r>
+          </a:p>
+          <a:p>
+            <a:pPr marL="698500" lvl="1" indent="-342900"/>
+            <a:endParaRPr lang="de-DE" dirty="0"/>
+          </a:p>
+          <a:p>
+            <a:pPr marL="342900" indent="-342900">
+              <a:buFont typeface="Arial" panose="020B0604020202020204" pitchFamily="34" charset="0"/>
+              <a:buChar char="•"/>
+            </a:pPr>
+            <a:endParaRPr lang="de-DE" dirty="0"/>
+          </a:p>
+        </p:txBody>
+      </p:sp>
+      <p:pic>
+        <p:nvPicPr>
+          <p:cNvPr id="1026" name="Picture 2" descr="European Social Survey | SSHOPENCLOUD">
+            <a:extLst>
+              <a:ext uri="{FF2B5EF4-FFF2-40B4-BE49-F238E27FC236}">
+                <a16:creationId xmlns:a16="http://schemas.microsoft.com/office/drawing/2014/main" id="{F4E3C064-B307-C2D8-3435-810E5F638D73}"/>
+              </a:ext>
+            </a:extLst>
+          </p:cNvPr>
+          <p:cNvPicPr>
+            <a:picLocks noChangeAspect="1" noChangeArrowheads="1"/>
+          </p:cNvPicPr>
+          <p:nvPr/>
+        </p:nvPicPr>
+        <p:blipFill>
+          <a:blip r:embed="rId2">
+            <a:extLst>
+              <a:ext uri="{28A0092B-C50C-407E-A947-70E740481C1C}">
+                <a14:useLocalDpi xmlns:a14="http://schemas.microsoft.com/office/drawing/2010/main" val="0"/>
+              </a:ext>
+            </a:extLst>
+          </a:blip>
+          <a:srcRect/>
+          <a:stretch>
+            <a:fillRect/>
+          </a:stretch>
+        </p:blipFill>
+        <p:spPr bwMode="auto">
+          <a:xfrm>
+            <a:off x="4766045" y="76815"/>
+            <a:ext cx="4673675" cy="3115783"/>
+          </a:xfrm>
+          <a:prstGeom prst="rect">
+            <a:avLst/>
+          </a:prstGeom>
+          <a:noFill/>
+          <a:extLst>
+            <a:ext uri="{909E8E84-426E-40DD-AFC4-6F175D3DCCD1}">
+              <a14:hiddenFill xmlns:a14="http://schemas.microsoft.com/office/drawing/2010/main">
+                <a:solidFill>
+                  <a:srgbClr val="FFFFFF"/>
+                </a:solidFill>
+              </a14:hiddenFill>
+            </a:ext>
+          </a:extLst>
+        </p:spPr>
+      </p:pic>
+    </p:spTree>
+    <p:extLst>
+      <p:ext uri="{BB962C8B-B14F-4D97-AF65-F5344CB8AC3E}">
+        <p14:creationId xmlns:p14="http://schemas.microsoft.com/office/powerpoint/2010/main" val="3891049118"/>
+      </p:ext>
+    </p:extLst>
+  </p:cSld>
+  <p:clrMapOvr>
+    <a:masterClrMapping/>
+  </p:clrMapOvr>
+  <p:transition spd="slow"/>
+</p:sld>
+</file>
+
+<file path=ppt/slides/slide22.xml><?xml version="1.0" encoding="utf-8"?>
 <p:sld xmlns:a="http://schemas.openxmlformats.org/drawingml/2006/main" xmlns:r="http://schemas.openxmlformats.org/officeDocument/2006/relationships" xmlns:p="http://schemas.openxmlformats.org/presentationml/2006/main">
   <p:cSld>
     <p:spTree>
@@ -11667,7 +12236,7 @@
 </p:sld>
 </file>
 
-<file path=ppt/slides/slide22.xml><?xml version="1.0" encoding="utf-8"?>
+<file path=ppt/slides/slide23.xml><?xml version="1.0" encoding="utf-8"?>
 <p:sld xmlns:a="http://schemas.openxmlformats.org/drawingml/2006/main" xmlns:r="http://schemas.openxmlformats.org/officeDocument/2006/relationships" xmlns:p="http://schemas.openxmlformats.org/presentationml/2006/main">
   <p:cSld>
     <p:spTree>
@@ -11887,7 +12456,7 @@
 </p:sld>
 </file>
 
-<file path=ppt/slides/slide23.xml><?xml version="1.0" encoding="utf-8"?>
+<file path=ppt/slides/slide24.xml><?xml version="1.0" encoding="utf-8"?>
 <p:sld xmlns:a="http://schemas.openxmlformats.org/drawingml/2006/main" xmlns:r="http://schemas.openxmlformats.org/officeDocument/2006/relationships" xmlns:p="http://schemas.openxmlformats.org/presentationml/2006/main">
   <p:cSld>
     <p:spTree>
@@ -11932,35 +12501,6 @@
           </a:p>
         </p:txBody>
       </p:sp>
-      <p:pic>
-        <p:nvPicPr>
-          <p:cNvPr id="10" name="Content Placeholder 9">
-            <a:extLst>
-              <a:ext uri="{FF2B5EF4-FFF2-40B4-BE49-F238E27FC236}">
-                <a16:creationId xmlns:a16="http://schemas.microsoft.com/office/drawing/2014/main" id="{59185352-D51E-4AEB-875F-C203288AAEA8}"/>
-              </a:ext>
-            </a:extLst>
-          </p:cNvPr>
-          <p:cNvPicPr>
-            <a:picLocks noGrp="1" noChangeAspect="1"/>
-          </p:cNvPicPr>
-          <p:nvPr>
-            <p:ph sz="quarter" idx="11"/>
-          </p:nvPr>
-        </p:nvPicPr>
-        <p:blipFill>
-          <a:blip r:embed="rId2"/>
-          <a:stretch>
-            <a:fillRect/>
-          </a:stretch>
-        </p:blipFill>
-        <p:spPr>
-          <a:xfrm>
-            <a:off x="5010332" y="736600"/>
-            <a:ext cx="3460385" cy="4238625"/>
-          </a:xfrm>
-        </p:spPr>
-      </p:pic>
       <p:sp>
         <p:nvSpPr>
           <p:cNvPr id="4" name="Content Placeholder 3">
@@ -12036,6 +12576,31 @@
           </a:p>
         </p:txBody>
       </p:sp>
+      <p:sp>
+        <p:nvSpPr>
+          <p:cNvPr id="5" name="Content Placeholder 4">
+            <a:extLst>
+              <a:ext uri="{FF2B5EF4-FFF2-40B4-BE49-F238E27FC236}">
+                <a16:creationId xmlns:a16="http://schemas.microsoft.com/office/drawing/2014/main" id="{DBA7B89F-38B8-431E-E7B4-FE69D218D397}"/>
+              </a:ext>
+            </a:extLst>
+          </p:cNvPr>
+          <p:cNvSpPr>
+            <a:spLocks noGrp="1"/>
+          </p:cNvSpPr>
+          <p:nvPr>
+            <p:ph sz="quarter" idx="11"/>
+          </p:nvPr>
+        </p:nvSpPr>
+        <p:spPr/>
+        <p:txBody>
+          <a:bodyPr/>
+          <a:lstStyle/>
+          <a:p>
+            <a:endParaRPr lang="en-US"/>
+          </a:p>
+        </p:txBody>
+      </p:sp>
     </p:spTree>
     <p:extLst>
       <p:ext uri="{BB962C8B-B14F-4D97-AF65-F5344CB8AC3E}">
@@ -12050,7 +12615,7 @@
 </p:sld>
 </file>
 
-<file path=ppt/slides/slide24.xml><?xml version="1.0" encoding="utf-8"?>
+<file path=ppt/slides/slide25.xml><?xml version="1.0" encoding="utf-8"?>
 <p:sld xmlns:a="http://schemas.openxmlformats.org/drawingml/2006/main" xmlns:r="http://schemas.openxmlformats.org/officeDocument/2006/relationships" xmlns:p="http://schemas.openxmlformats.org/presentationml/2006/main">
   <p:cSld>
     <p:spTree>
@@ -12110,14 +12675,14 @@
           <p:nvPr>
             <p:extLst>
               <p:ext uri="{D42A27DB-BD31-4B8C-83A1-F6EECF244321}">
-                <p14:modId xmlns:p14="http://schemas.microsoft.com/office/powerpoint/2010/main" val="1411860579"/>
+                <p14:modId xmlns:p14="http://schemas.microsoft.com/office/powerpoint/2010/main" val="1107419309"/>
               </p:ext>
             </p:extLst>
           </p:nvPr>
         </p:nvGraphicFramePr>
         <p:xfrm>
           <a:off x="217711" y="1322486"/>
-          <a:ext cx="8708578" cy="3263022"/>
+          <a:ext cx="8708578" cy="2939128"/>
         </p:xfrm>
         <a:graphic>
           <a:graphicData uri="http://schemas.openxmlformats.org/drawingml/2006/table">
@@ -12811,13 +13376,168 @@
                           <a:spcPts val="0"/>
                         </a:spcAft>
                       </a:pPr>
-                      <a:endParaRPr lang="de-DE" sz="1400" dirty="0">
+                      <a:endParaRPr lang="en-US" sz="1400" dirty="0">
                         <a:solidFill>
                           <a:schemeClr val="tx1"/>
                         </a:solidFill>
                         <a:effectLst/>
+                        <a:latin typeface="Times New Roman" panose="02020603050405020304" pitchFamily="18" charset="0"/>
+                        <a:ea typeface="Times New Roman" panose="02020603050405020304" pitchFamily="18" charset="0"/>
+                        <a:cs typeface="Times New Roman" panose="02020603050405020304" pitchFamily="18" charset="0"/>
                       </a:endParaRPr>
                     </a:p>
+                  </a:txBody>
+                  <a:tcPr marL="68580" marR="68580" marT="0" marB="0" anchor="ctr"/>
+                </a:tc>
+                <a:tc>
+                  <a:txBody>
+                    <a:bodyPr/>
+                    <a:lstStyle/>
+                    <a:p>
+                      <a:pPr marL="0" marR="0" algn="ctr">
+                        <a:spcBef>
+                          <a:spcPts val="0"/>
+                        </a:spcBef>
+                        <a:spcAft>
+                          <a:spcPts val="0"/>
+                        </a:spcAft>
+                      </a:pPr>
+                      <a:endParaRPr lang="en-US" sz="1600" dirty="0">
+                        <a:effectLst/>
+                        <a:latin typeface="+mj-lt"/>
+                        <a:ea typeface="Times New Roman" panose="02020603050405020304" pitchFamily="18" charset="0"/>
+                        <a:cs typeface="Times New Roman" panose="02020603050405020304" pitchFamily="18" charset="0"/>
+                      </a:endParaRPr>
+                    </a:p>
+                  </a:txBody>
+                  <a:tcPr marL="68580" marR="68580" marT="0" marB="0" anchor="ctr"/>
+                </a:tc>
+                <a:tc>
+                  <a:txBody>
+                    <a:bodyPr/>
+                    <a:lstStyle/>
+                    <a:p>
+                      <a:pPr marL="0" marR="0" algn="ctr">
+                        <a:spcBef>
+                          <a:spcPts val="0"/>
+                        </a:spcBef>
+                        <a:spcAft>
+                          <a:spcPts val="0"/>
+                        </a:spcAft>
+                      </a:pPr>
+                      <a:endParaRPr lang="en-US" sz="1600" dirty="0">
+                        <a:effectLst/>
+                        <a:latin typeface="+mj-lt"/>
+                        <a:ea typeface="Times New Roman" panose="02020603050405020304" pitchFamily="18" charset="0"/>
+                        <a:cs typeface="Times New Roman" panose="02020603050405020304" pitchFamily="18" charset="0"/>
+                      </a:endParaRPr>
+                    </a:p>
+                  </a:txBody>
+                  <a:tcPr marL="68580" marR="68580" marT="0" marB="0" anchor="ctr"/>
+                </a:tc>
+                <a:tc>
+                  <a:txBody>
+                    <a:bodyPr/>
+                    <a:lstStyle/>
+                    <a:p>
+                      <a:pPr marL="0" marR="0" algn="ctr">
+                        <a:spcBef>
+                          <a:spcPts val="0"/>
+                        </a:spcBef>
+                        <a:spcAft>
+                          <a:spcPts val="0"/>
+                        </a:spcAft>
+                      </a:pPr>
+                      <a:endParaRPr lang="en-US" sz="1600" dirty="0">
+                        <a:effectLst/>
+                        <a:latin typeface="+mj-lt"/>
+                        <a:ea typeface="Times New Roman" panose="02020603050405020304" pitchFamily="18" charset="0"/>
+                        <a:cs typeface="Times New Roman" panose="02020603050405020304" pitchFamily="18" charset="0"/>
+                      </a:endParaRPr>
+                    </a:p>
+                  </a:txBody>
+                  <a:tcPr marL="68580" marR="68580" marT="0" marB="0" anchor="ctr"/>
+                </a:tc>
+                <a:tc>
+                  <a:txBody>
+                    <a:bodyPr/>
+                    <a:lstStyle/>
+                    <a:p>
+                      <a:pPr marL="0" marR="0" algn="ctr">
+                        <a:spcBef>
+                          <a:spcPts val="0"/>
+                        </a:spcBef>
+                        <a:spcAft>
+                          <a:spcPts val="0"/>
+                        </a:spcAft>
+                      </a:pPr>
+                      <a:endParaRPr lang="en-US" sz="1600" dirty="0">
+                        <a:effectLst/>
+                        <a:latin typeface="+mj-lt"/>
+                        <a:ea typeface="Times New Roman" panose="02020603050405020304" pitchFamily="18" charset="0"/>
+                        <a:cs typeface="Times New Roman" panose="02020603050405020304" pitchFamily="18" charset="0"/>
+                      </a:endParaRPr>
+                    </a:p>
+                  </a:txBody>
+                  <a:tcPr marL="68580" marR="68580" marT="0" marB="0" anchor="ctr"/>
+                </a:tc>
+                <a:tc>
+                  <a:txBody>
+                    <a:bodyPr/>
+                    <a:lstStyle/>
+                    <a:p>
+                      <a:pPr marL="0" marR="0" algn="ctr">
+                        <a:spcBef>
+                          <a:spcPts val="0"/>
+                        </a:spcBef>
+                        <a:spcAft>
+                          <a:spcPts val="0"/>
+                        </a:spcAft>
+                      </a:pPr>
+                      <a:endParaRPr lang="en-US" sz="1600" dirty="0">
+                        <a:effectLst/>
+                        <a:latin typeface="+mj-lt"/>
+                        <a:ea typeface="Times New Roman" panose="02020603050405020304" pitchFamily="18" charset="0"/>
+                        <a:cs typeface="Times New Roman" panose="02020603050405020304" pitchFamily="18" charset="0"/>
+                      </a:endParaRPr>
+                    </a:p>
+                  </a:txBody>
+                  <a:tcPr marL="68580" marR="68580" marT="0" marB="0" anchor="ctr"/>
+                </a:tc>
+                <a:tc>
+                  <a:txBody>
+                    <a:bodyPr/>
+                    <a:lstStyle/>
+                    <a:p>
+                      <a:pPr marL="0" marR="0" algn="ctr">
+                        <a:spcBef>
+                          <a:spcPts val="0"/>
+                        </a:spcBef>
+                        <a:spcAft>
+                          <a:spcPts val="0"/>
+                        </a:spcAft>
+                      </a:pPr>
+                      <a:endParaRPr lang="en-US" sz="1600" dirty="0">
+                        <a:effectLst/>
+                        <a:latin typeface="+mj-lt"/>
+                        <a:ea typeface="Times New Roman" panose="02020603050405020304" pitchFamily="18" charset="0"/>
+                        <a:cs typeface="Times New Roman" panose="02020603050405020304" pitchFamily="18" charset="0"/>
+                      </a:endParaRPr>
+                    </a:p>
+                  </a:txBody>
+                  <a:tcPr marL="68580" marR="68580" marT="0" marB="0" anchor="ctr"/>
+                </a:tc>
+                <a:extLst>
+                  <a:ext uri="{0D108BD9-81ED-4DB2-BD59-A6C34878D82A}">
+                    <a16:rowId xmlns:a16="http://schemas.microsoft.com/office/drawing/2014/main" val="4199074025"/>
+                  </a:ext>
+                </a:extLst>
+              </a:tr>
+              <a:tr h="948558">
+                <a:tc>
+                  <a:txBody>
+                    <a:bodyPr/>
+                    <a:lstStyle/>
                     <a:p>
                       <a:pPr marL="0" marR="0">
                         <a:spcBef>
@@ -12834,26 +13554,7 @@
                           </a:solidFill>
                           <a:effectLst/>
                         </a:rPr>
-                        <a:t>Politische Teilhabe</a:t>
-                      </a:r>
-                    </a:p>
-                    <a:p>
-                      <a:pPr marL="0" marR="0">
-                        <a:spcBef>
-                          <a:spcPts val="0"/>
-                        </a:spcBef>
-                        <a:spcAft>
-                          <a:spcPts val="0"/>
-                        </a:spcAft>
-                      </a:pPr>
-                      <a:r>
-                        <a:rPr lang="de-DE" sz="1400" dirty="0">
-                          <a:solidFill>
-                            <a:schemeClr val="tx1"/>
-                          </a:solidFill>
-                          <a:effectLst/>
-                        </a:rPr>
-                        <a:t>  </a:t>
+                        <a:t>Vorurteile, Rassismus &amp; gruppenbezogene Menschenfeindlichkeit</a:t>
                       </a:r>
                       <a:endParaRPr lang="en-US" sz="1400" dirty="0">
                         <a:solidFill>
@@ -12882,13 +13583,13 @@
                         </a:spcAft>
                       </a:pPr>
                       <a:r>
-                        <a:rPr lang="de-DE" sz="1600">
+                        <a:rPr lang="de-DE" sz="1600" dirty="0">
                           <a:effectLst/>
                           <a:latin typeface="+mj-lt"/>
                         </a:rPr>
                         <a:t>1-B</a:t>
                       </a:r>
-                      <a:endParaRPr lang="en-US" sz="1600">
+                      <a:endParaRPr lang="en-US" sz="1600" dirty="0">
                         <a:effectLst/>
                         <a:latin typeface="+mj-lt"/>
                         <a:ea typeface="Times New Roman" panose="02020603050405020304" pitchFamily="18" charset="0"/>
@@ -12912,13 +13613,13 @@
                         </a:spcAft>
                       </a:pPr>
                       <a:r>
-                        <a:rPr lang="de-DE" sz="1600">
+                        <a:rPr lang="de-DE" sz="1600" dirty="0">
                           <a:effectLst/>
                           <a:latin typeface="+mj-lt"/>
                         </a:rPr>
                         <a:t>2-B</a:t>
                       </a:r>
-                      <a:endParaRPr lang="en-US" sz="1600">
+                      <a:endParaRPr lang="en-US" sz="1600" dirty="0">
                         <a:effectLst/>
                         <a:latin typeface="+mj-lt"/>
                         <a:ea typeface="Times New Roman" panose="02020603050405020304" pitchFamily="18" charset="0"/>
@@ -12942,13 +13643,13 @@
                         </a:spcAft>
                       </a:pPr>
                       <a:r>
-                        <a:rPr lang="de-DE" sz="1600">
+                        <a:rPr lang="de-DE" sz="1600" dirty="0">
                           <a:effectLst/>
                           <a:latin typeface="+mj-lt"/>
                         </a:rPr>
                         <a:t>3-B</a:t>
                       </a:r>
-                      <a:endParaRPr lang="en-US" sz="1600">
+                      <a:endParaRPr lang="en-US" sz="1600" dirty="0">
                         <a:effectLst/>
                         <a:latin typeface="+mj-lt"/>
                         <a:ea typeface="Times New Roman" panose="02020603050405020304" pitchFamily="18" charset="0"/>
@@ -13038,216 +13739,6 @@
                 </a:tc>
                 <a:extLst>
                   <a:ext uri="{0D108BD9-81ED-4DB2-BD59-A6C34878D82A}">
-                    <a16:rowId xmlns:a16="http://schemas.microsoft.com/office/drawing/2014/main" val="4199074025"/>
-                  </a:ext>
-                </a:extLst>
-              </a:tr>
-              <a:tr h="948558">
-                <a:tc>
-                  <a:txBody>
-                    <a:bodyPr/>
-                    <a:lstStyle/>
-                    <a:p>
-                      <a:pPr marL="0" marR="0">
-                        <a:spcBef>
-                          <a:spcPts val="0"/>
-                        </a:spcBef>
-                        <a:spcAft>
-                          <a:spcPts val="0"/>
-                        </a:spcAft>
-                      </a:pPr>
-                      <a:r>
-                        <a:rPr lang="de-DE" sz="1400" dirty="0">
-                          <a:solidFill>
-                            <a:schemeClr val="tx1"/>
-                          </a:solidFill>
-                          <a:effectLst/>
-                        </a:rPr>
-                        <a:t>Vorurteile, Rassismus &amp; gruppenbezogene Menschenfeindlichkeit</a:t>
-                      </a:r>
-                      <a:endParaRPr lang="en-US" sz="1400" dirty="0">
-                        <a:solidFill>
-                          <a:schemeClr val="tx1"/>
-                        </a:solidFill>
-                        <a:effectLst/>
-                        <a:latin typeface="Times New Roman" panose="02020603050405020304" pitchFamily="18" charset="0"/>
-                        <a:ea typeface="Times New Roman" panose="02020603050405020304" pitchFamily="18" charset="0"/>
-                        <a:cs typeface="Times New Roman" panose="02020603050405020304" pitchFamily="18" charset="0"/>
-                      </a:endParaRPr>
-                    </a:p>
-                  </a:txBody>
-                  <a:tcPr marL="68580" marR="68580" marT="0" marB="0" anchor="ctr"/>
-                </a:tc>
-                <a:tc>
-                  <a:txBody>
-                    <a:bodyPr/>
-                    <a:lstStyle/>
-                    <a:p>
-                      <a:pPr marL="0" marR="0" algn="ctr">
-                        <a:spcBef>
-                          <a:spcPts val="0"/>
-                        </a:spcBef>
-                        <a:spcAft>
-                          <a:spcPts val="0"/>
-                        </a:spcAft>
-                      </a:pPr>
-                      <a:r>
-                        <a:rPr lang="de-DE" sz="1600">
-                          <a:effectLst/>
-                          <a:latin typeface="+mj-lt"/>
-                        </a:rPr>
-                        <a:t>1-C</a:t>
-                      </a:r>
-                      <a:endParaRPr lang="en-US" sz="1600">
-                        <a:effectLst/>
-                        <a:latin typeface="+mj-lt"/>
-                        <a:ea typeface="Times New Roman" panose="02020603050405020304" pitchFamily="18" charset="0"/>
-                        <a:cs typeface="Times New Roman" panose="02020603050405020304" pitchFamily="18" charset="0"/>
-                      </a:endParaRPr>
-                    </a:p>
-                  </a:txBody>
-                  <a:tcPr marL="68580" marR="68580" marT="0" marB="0" anchor="ctr"/>
-                </a:tc>
-                <a:tc>
-                  <a:txBody>
-                    <a:bodyPr/>
-                    <a:lstStyle/>
-                    <a:p>
-                      <a:pPr marL="0" marR="0" algn="ctr">
-                        <a:spcBef>
-                          <a:spcPts val="0"/>
-                        </a:spcBef>
-                        <a:spcAft>
-                          <a:spcPts val="0"/>
-                        </a:spcAft>
-                      </a:pPr>
-                      <a:r>
-                        <a:rPr lang="de-DE" sz="1600" dirty="0">
-                          <a:effectLst/>
-                          <a:latin typeface="+mj-lt"/>
-                        </a:rPr>
-                        <a:t>2-C</a:t>
-                      </a:r>
-                      <a:endParaRPr lang="en-US" sz="1600" dirty="0">
-                        <a:effectLst/>
-                        <a:latin typeface="+mj-lt"/>
-                        <a:ea typeface="Times New Roman" panose="02020603050405020304" pitchFamily="18" charset="0"/>
-                        <a:cs typeface="Times New Roman" panose="02020603050405020304" pitchFamily="18" charset="0"/>
-                      </a:endParaRPr>
-                    </a:p>
-                  </a:txBody>
-                  <a:tcPr marL="68580" marR="68580" marT="0" marB="0" anchor="ctr"/>
-                </a:tc>
-                <a:tc>
-                  <a:txBody>
-                    <a:bodyPr/>
-                    <a:lstStyle/>
-                    <a:p>
-                      <a:pPr marL="0" marR="0" algn="ctr">
-                        <a:spcBef>
-                          <a:spcPts val="0"/>
-                        </a:spcBef>
-                        <a:spcAft>
-                          <a:spcPts val="0"/>
-                        </a:spcAft>
-                      </a:pPr>
-                      <a:r>
-                        <a:rPr lang="de-DE" sz="1600" dirty="0">
-                          <a:effectLst/>
-                          <a:latin typeface="+mj-lt"/>
-                        </a:rPr>
-                        <a:t>3-C</a:t>
-                      </a:r>
-                      <a:endParaRPr lang="en-US" sz="1600" dirty="0">
-                        <a:effectLst/>
-                        <a:latin typeface="+mj-lt"/>
-                        <a:ea typeface="Times New Roman" panose="02020603050405020304" pitchFamily="18" charset="0"/>
-                        <a:cs typeface="Times New Roman" panose="02020603050405020304" pitchFamily="18" charset="0"/>
-                      </a:endParaRPr>
-                    </a:p>
-                  </a:txBody>
-                  <a:tcPr marL="68580" marR="68580" marT="0" marB="0" anchor="ctr"/>
-                </a:tc>
-                <a:tc>
-                  <a:txBody>
-                    <a:bodyPr/>
-                    <a:lstStyle/>
-                    <a:p>
-                      <a:pPr marL="0" marR="0" algn="ctr">
-                        <a:spcBef>
-                          <a:spcPts val="0"/>
-                        </a:spcBef>
-                        <a:spcAft>
-                          <a:spcPts val="0"/>
-                        </a:spcAft>
-                      </a:pPr>
-                      <a:r>
-                        <a:rPr lang="en-US" sz="1600" dirty="0">
-                          <a:effectLst/>
-                          <a:latin typeface="+mj-lt"/>
-                          <a:ea typeface="Times New Roman" panose="02020603050405020304" pitchFamily="18" charset="0"/>
-                          <a:cs typeface="Times New Roman" panose="02020603050405020304" pitchFamily="18" charset="0"/>
-                        </a:rPr>
-                        <a:t>4-C</a:t>
-                      </a:r>
-                    </a:p>
-                  </a:txBody>
-                  <a:tcPr marL="68580" marR="68580" marT="0" marB="0" anchor="ctr"/>
-                </a:tc>
-                <a:tc>
-                  <a:txBody>
-                    <a:bodyPr/>
-                    <a:lstStyle/>
-                    <a:p>
-                      <a:pPr marL="0" marR="0" algn="ctr">
-                        <a:spcBef>
-                          <a:spcPts val="0"/>
-                        </a:spcBef>
-                        <a:spcAft>
-                          <a:spcPts val="0"/>
-                        </a:spcAft>
-                      </a:pPr>
-                      <a:r>
-                        <a:rPr lang="en-US" sz="1600" dirty="0">
-                          <a:effectLst/>
-                          <a:latin typeface="+mj-lt"/>
-                          <a:ea typeface="Times New Roman" panose="02020603050405020304" pitchFamily="18" charset="0"/>
-                          <a:cs typeface="Times New Roman" panose="02020603050405020304" pitchFamily="18" charset="0"/>
-                        </a:rPr>
-                        <a:t>5-C</a:t>
-                      </a:r>
-                    </a:p>
-                  </a:txBody>
-                  <a:tcPr marL="68580" marR="68580" marT="0" marB="0" anchor="ctr"/>
-                </a:tc>
-                <a:tc>
-                  <a:txBody>
-                    <a:bodyPr/>
-                    <a:lstStyle/>
-                    <a:p>
-                      <a:pPr marL="0" marR="0" algn="ctr">
-                        <a:spcBef>
-                          <a:spcPts val="0"/>
-                        </a:spcBef>
-                        <a:spcAft>
-                          <a:spcPts val="0"/>
-                        </a:spcAft>
-                      </a:pPr>
-                      <a:r>
-                        <a:rPr lang="en-US" sz="1600" dirty="0">
-                          <a:effectLst/>
-                          <a:latin typeface="+mj-lt"/>
-                          <a:ea typeface="Times New Roman" panose="02020603050405020304" pitchFamily="18" charset="0"/>
-                          <a:cs typeface="Times New Roman" panose="02020603050405020304" pitchFamily="18" charset="0"/>
-                        </a:rPr>
-                        <a:t>6-C</a:t>
-                      </a:r>
-                    </a:p>
-                  </a:txBody>
-                  <a:tcPr marL="68580" marR="68580" marT="0" marB="0" anchor="ctr"/>
-                </a:tc>
-                <a:extLst>
-                  <a:ext uri="{0D108BD9-81ED-4DB2-BD59-A6C34878D82A}">
                     <a16:rowId xmlns:a16="http://schemas.microsoft.com/office/drawing/2014/main" val="1067210418"/>
                   </a:ext>
                 </a:extLst>
@@ -13260,6 +13751,561 @@
     <p:extLst>
       <p:ext uri="{BB962C8B-B14F-4D97-AF65-F5344CB8AC3E}">
         <p14:creationId xmlns:p14="http://schemas.microsoft.com/office/powerpoint/2010/main" val="2106003604"/>
+      </p:ext>
+    </p:extLst>
+  </p:cSld>
+  <p:clrMapOvr>
+    <a:masterClrMapping/>
+  </p:clrMapOvr>
+  <p:transition spd="slow"/>
+</p:sld>
+</file>
+
+<file path=ppt/slides/slide26.xml><?xml version="1.0" encoding="utf-8"?>
+<p:sld xmlns:a="http://schemas.openxmlformats.org/drawingml/2006/main" xmlns:r="http://schemas.openxmlformats.org/officeDocument/2006/relationships" xmlns:p="http://schemas.openxmlformats.org/presentationml/2006/main">
+  <p:cSld>
+    <p:spTree>
+      <p:nvGrpSpPr>
+        <p:cNvPr id="1" name=""/>
+        <p:cNvGrpSpPr/>
+        <p:nvPr/>
+      </p:nvGrpSpPr>
+      <p:grpSpPr>
+        <a:xfrm>
+          <a:off x="0" y="0"/>
+          <a:ext cx="0" cy="0"/>
+          <a:chOff x="0" y="0"/>
+          <a:chExt cx="0" cy="0"/>
+        </a:xfrm>
+      </p:grpSpPr>
+      <p:sp>
+        <p:nvSpPr>
+          <p:cNvPr id="2" name="Title 1">
+            <a:extLst>
+              <a:ext uri="{FF2B5EF4-FFF2-40B4-BE49-F238E27FC236}">
+                <a16:creationId xmlns:a16="http://schemas.microsoft.com/office/drawing/2014/main" id="{FBF40628-DDF3-4ADD-8558-AB058301EB29}"/>
+              </a:ext>
+            </a:extLst>
+          </p:cNvPr>
+          <p:cNvSpPr>
+            <a:spLocks noGrp="1"/>
+          </p:cNvSpPr>
+          <p:nvPr>
+            <p:ph type="title"/>
+          </p:nvPr>
+        </p:nvSpPr>
+        <p:spPr/>
+        <p:txBody>
+          <a:bodyPr/>
+          <a:lstStyle/>
+          <a:p>
+            <a:r>
+              <a:rPr lang="en-US" dirty="0" err="1"/>
+              <a:t>Vorstellung</a:t>
+            </a:r>
+            <a:r>
+              <a:rPr lang="en-US" dirty="0"/>
+              <a:t> II: </a:t>
+            </a:r>
+            <a:r>
+              <a:rPr lang="en-US" dirty="0" err="1"/>
+              <a:t>Eigene</a:t>
+            </a:r>
+            <a:r>
+              <a:rPr lang="en-US" dirty="0"/>
+              <a:t> </a:t>
+            </a:r>
+            <a:r>
+              <a:rPr lang="en-US" dirty="0" err="1"/>
+              <a:t>Forschung</a:t>
+            </a:r>
+            <a:r>
+              <a:rPr lang="en-US" dirty="0"/>
+              <a:t> </a:t>
+            </a:r>
+            <a:endParaRPr lang="de-DE" dirty="0"/>
+          </a:p>
+        </p:txBody>
+      </p:sp>
+      <p:sp>
+        <p:nvSpPr>
+          <p:cNvPr id="3" name="Content Placeholder 2">
+            <a:extLst>
+              <a:ext uri="{FF2B5EF4-FFF2-40B4-BE49-F238E27FC236}">
+                <a16:creationId xmlns:a16="http://schemas.microsoft.com/office/drawing/2014/main" id="{1F105AE2-F173-4F10-B415-4027EAE2F22D}"/>
+              </a:ext>
+            </a:extLst>
+          </p:cNvPr>
+          <p:cNvSpPr>
+            <a:spLocks noGrp="1"/>
+          </p:cNvSpPr>
+          <p:nvPr>
+            <p:ph idx="1"/>
+          </p:nvPr>
+        </p:nvSpPr>
+        <p:spPr/>
+        <p:txBody>
+          <a:bodyPr/>
+          <a:lstStyle/>
+          <a:p>
+            <a:pPr marL="285750" indent="-285750">
+              <a:buFont typeface="Arial" panose="020B0604020202020204" pitchFamily="34" charset="0"/>
+              <a:buChar char="•"/>
+            </a:pPr>
+            <a:r>
+              <a:rPr lang="de-DE" sz="2400" dirty="0"/>
+              <a:t>Effekte von wirtschaftlicher und sozialer Unsicherheit auf politische Wahrnehmungen und Verhalten </a:t>
+            </a:r>
+          </a:p>
+          <a:p>
+            <a:pPr marL="285750" indent="-285750">
+              <a:buFont typeface="Arial" panose="020B0604020202020204" pitchFamily="34" charset="0"/>
+              <a:buChar char="•"/>
+            </a:pPr>
+            <a:r>
+              <a:rPr lang="de-DE" sz="2400" dirty="0"/>
+              <a:t>Interaktion mit institutionellen Rahmenbedingungen </a:t>
+            </a:r>
+          </a:p>
+          <a:p>
+            <a:pPr marL="641350" lvl="1" indent="-285750">
+              <a:buFont typeface="Arial" panose="020B0604020202020204" pitchFamily="34" charset="0"/>
+              <a:buChar char="•"/>
+            </a:pPr>
+            <a:r>
+              <a:rPr lang="de-DE" sz="2400" dirty="0"/>
+              <a:t>Vertrauen </a:t>
+            </a:r>
+          </a:p>
+          <a:p>
+            <a:pPr marL="641350" lvl="1" indent="-285750">
+              <a:buFont typeface="Arial" panose="020B0604020202020204" pitchFamily="34" charset="0"/>
+              <a:buChar char="•"/>
+            </a:pPr>
+            <a:r>
+              <a:rPr lang="de-DE" sz="2400" dirty="0"/>
+              <a:t>Politische Selbstwirksamkeit </a:t>
+            </a:r>
+          </a:p>
+          <a:p>
+            <a:pPr marL="641350" lvl="1" indent="-285750">
+              <a:buFont typeface="Arial" panose="020B0604020202020204" pitchFamily="34" charset="0"/>
+              <a:buChar char="•"/>
+            </a:pPr>
+            <a:r>
+              <a:rPr lang="de-DE" sz="2400" dirty="0"/>
+              <a:t>Anti-Eliten Politik </a:t>
+            </a:r>
+          </a:p>
+          <a:p>
+            <a:pPr marL="641350" lvl="1" indent="-285750">
+              <a:buFont typeface="Arial" panose="020B0604020202020204" pitchFamily="34" charset="0"/>
+              <a:buChar char="•"/>
+            </a:pPr>
+            <a:r>
+              <a:rPr lang="de-DE" sz="2400" dirty="0"/>
+              <a:t>Sozialstaatliche Maßnahmen </a:t>
+            </a:r>
+          </a:p>
+          <a:p>
+            <a:pPr marL="641350" lvl="1" indent="-285750">
+              <a:buFont typeface="Arial" panose="020B0604020202020204" pitchFamily="34" charset="0"/>
+              <a:buChar char="•"/>
+            </a:pPr>
+            <a:r>
+              <a:rPr lang="de-DE" sz="2400" dirty="0"/>
+              <a:t>Emotionen und Politische Psychologie  </a:t>
+            </a:r>
+          </a:p>
+          <a:p>
+            <a:pPr marL="641350" lvl="1" indent="-285750">
+              <a:buFont typeface="Arial" panose="020B0604020202020204" pitchFamily="34" charset="0"/>
+              <a:buChar char="•"/>
+            </a:pPr>
+            <a:r>
+              <a:rPr lang="de-DE" sz="2400" dirty="0"/>
+              <a:t>Rassismus und Gruppenbezogene Menschenfeindlichkeit</a:t>
+            </a:r>
+          </a:p>
+          <a:p>
+            <a:pPr marL="285750" indent="-285750">
+              <a:buFont typeface="Arial" panose="020B0604020202020204" pitchFamily="34" charset="0"/>
+              <a:buChar char="•"/>
+            </a:pPr>
+            <a:endParaRPr lang="de-DE" sz="2400" dirty="0"/>
+          </a:p>
+          <a:p>
+            <a:pPr marL="285750" indent="-285750">
+              <a:buFont typeface="Arial" panose="020B0604020202020204" pitchFamily="34" charset="0"/>
+              <a:buChar char="•"/>
+            </a:pPr>
+            <a:endParaRPr lang="de-DE" sz="2400" dirty="0"/>
+          </a:p>
+          <a:p>
+            <a:endParaRPr lang="de-DE" sz="2400" dirty="0"/>
+          </a:p>
+        </p:txBody>
+      </p:sp>
+    </p:spTree>
+    <p:extLst>
+      <p:ext uri="{BB962C8B-B14F-4D97-AF65-F5344CB8AC3E}">
+        <p14:creationId xmlns:p14="http://schemas.microsoft.com/office/powerpoint/2010/main" val="937996676"/>
+      </p:ext>
+    </p:extLst>
+  </p:cSld>
+  <p:clrMapOvr>
+    <a:masterClrMapping/>
+  </p:clrMapOvr>
+  <p:transition spd="slow"/>
+</p:sld>
+</file>
+
+<file path=ppt/slides/slide27.xml><?xml version="1.0" encoding="utf-8"?>
+<p:sld xmlns:a="http://schemas.openxmlformats.org/drawingml/2006/main" xmlns:r="http://schemas.openxmlformats.org/officeDocument/2006/relationships" xmlns:p="http://schemas.openxmlformats.org/presentationml/2006/main">
+  <p:cSld>
+    <p:spTree>
+      <p:nvGrpSpPr>
+        <p:cNvPr id="1" name=""/>
+        <p:cNvGrpSpPr/>
+        <p:nvPr/>
+      </p:nvGrpSpPr>
+      <p:grpSpPr>
+        <a:xfrm>
+          <a:off x="0" y="0"/>
+          <a:ext cx="0" cy="0"/>
+          <a:chOff x="0" y="0"/>
+          <a:chExt cx="0" cy="0"/>
+        </a:xfrm>
+      </p:grpSpPr>
+      <p:sp>
+        <p:nvSpPr>
+          <p:cNvPr id="2" name="Title 1">
+            <a:extLst>
+              <a:ext uri="{FF2B5EF4-FFF2-40B4-BE49-F238E27FC236}">
+                <a16:creationId xmlns:a16="http://schemas.microsoft.com/office/drawing/2014/main" id="{D799B1F5-8B8C-4A47-84AF-4ED4738769E4}"/>
+              </a:ext>
+            </a:extLst>
+          </p:cNvPr>
+          <p:cNvSpPr>
+            <a:spLocks noGrp="1"/>
+          </p:cNvSpPr>
+          <p:nvPr>
+            <p:ph type="title"/>
+          </p:nvPr>
+        </p:nvSpPr>
+        <p:spPr/>
+        <p:txBody>
+          <a:bodyPr/>
+          <a:lstStyle/>
+          <a:p>
+            <a:r>
+              <a:rPr lang="en-US" dirty="0" err="1"/>
+              <a:t>Wer</a:t>
+            </a:r>
+            <a:r>
+              <a:rPr lang="en-US" dirty="0"/>
+              <a:t> </a:t>
+            </a:r>
+            <a:r>
+              <a:rPr lang="en-US" dirty="0" err="1"/>
+              <a:t>seid</a:t>
+            </a:r>
+            <a:r>
+              <a:rPr lang="en-US" dirty="0"/>
+              <a:t> </a:t>
+            </a:r>
+            <a:r>
+              <a:rPr lang="en-US" dirty="0" err="1"/>
+              <a:t>ihr</a:t>
+            </a:r>
+            <a:r>
+              <a:rPr lang="en-US" dirty="0"/>
+              <a:t>? </a:t>
+            </a:r>
+            <a:endParaRPr lang="de-DE" dirty="0"/>
+          </a:p>
+        </p:txBody>
+      </p:sp>
+      <p:sp>
+        <p:nvSpPr>
+          <p:cNvPr id="3" name="Content Placeholder 2">
+            <a:extLst>
+              <a:ext uri="{FF2B5EF4-FFF2-40B4-BE49-F238E27FC236}">
+                <a16:creationId xmlns:a16="http://schemas.microsoft.com/office/drawing/2014/main" id="{5C07815A-E060-4191-9240-AD4D87886E72}"/>
+              </a:ext>
+            </a:extLst>
+          </p:cNvPr>
+          <p:cNvSpPr>
+            <a:spLocks noGrp="1"/>
+          </p:cNvSpPr>
+          <p:nvPr>
+            <p:ph idx="1"/>
+          </p:nvPr>
+        </p:nvSpPr>
+        <p:spPr/>
+        <p:txBody>
+          <a:bodyPr/>
+          <a:lstStyle/>
+          <a:p>
+            <a:r>
+              <a:rPr lang="de-DE" sz="2000" dirty="0"/>
+              <a:t>Warum haben Sie diesen Kurs ausgewählt?</a:t>
+            </a:r>
+          </a:p>
+          <a:p>
+            <a:r>
+              <a:rPr lang="de-DE" sz="2000" dirty="0"/>
+              <a:t>	Hintergrund in Psychologie </a:t>
+            </a:r>
+          </a:p>
+          <a:p>
+            <a:r>
+              <a:rPr lang="de-DE" sz="2000" dirty="0"/>
+              <a:t>	Hintergrund in Politikwissenschaften </a:t>
+            </a:r>
+          </a:p>
+          <a:p>
+            <a:r>
+              <a:rPr lang="de-DE" sz="2000" dirty="0"/>
+              <a:t>Empirische Forschung:</a:t>
+            </a:r>
+          </a:p>
+          <a:p>
+            <a:pPr lvl="1">
+              <a:buFont typeface="Arial" panose="020B0604020202020204" pitchFamily="34" charset="0"/>
+              <a:buChar char="•"/>
+            </a:pPr>
+            <a:r>
+              <a:rPr lang="de-DE" sz="2000" dirty="0"/>
+              <a:t>Wie würden Sie Ihre Kenntnisse im Bereich quantitative Methoden der empirischen Sozialforschung bewerten (0 – 10)? </a:t>
+            </a:r>
+          </a:p>
+          <a:p>
+            <a:pPr lvl="1">
+              <a:buFont typeface="Arial" panose="020B0604020202020204" pitchFamily="34" charset="0"/>
+              <a:buChar char="•"/>
+            </a:pPr>
+            <a:r>
+              <a:rPr lang="de-DE" sz="2000" dirty="0"/>
+              <a:t>Und Ihre Kenntnisse in R? (0 – 10) </a:t>
+            </a:r>
+          </a:p>
+          <a:p>
+            <a:pPr lvl="1">
+              <a:buFont typeface="Arial" panose="020B0604020202020204" pitchFamily="34" charset="0"/>
+              <a:buChar char="•"/>
+            </a:pPr>
+            <a:r>
+              <a:rPr lang="de-DE" sz="2000" dirty="0"/>
+              <a:t>Welche Methoden haben Sie in Ihrer BA-Arbeit benutzt?</a:t>
+            </a:r>
+          </a:p>
+          <a:p>
+            <a:endParaRPr lang="de-DE" sz="2000" dirty="0"/>
+          </a:p>
+        </p:txBody>
+      </p:sp>
+    </p:spTree>
+    <p:extLst>
+      <p:ext uri="{BB962C8B-B14F-4D97-AF65-F5344CB8AC3E}">
+        <p14:creationId xmlns:p14="http://schemas.microsoft.com/office/powerpoint/2010/main" val="1978773447"/>
+      </p:ext>
+    </p:extLst>
+  </p:cSld>
+  <p:clrMapOvr>
+    <a:masterClrMapping/>
+  </p:clrMapOvr>
+  <p:transition spd="slow"/>
+</p:sld>
+</file>
+
+<file path=ppt/slides/slide28.xml><?xml version="1.0" encoding="utf-8"?>
+<p:sld xmlns:a="http://schemas.openxmlformats.org/drawingml/2006/main" xmlns:r="http://schemas.openxmlformats.org/officeDocument/2006/relationships" xmlns:p="http://schemas.openxmlformats.org/presentationml/2006/main">
+  <p:cSld>
+    <p:spTree>
+      <p:nvGrpSpPr>
+        <p:cNvPr id="1" name=""/>
+        <p:cNvGrpSpPr/>
+        <p:nvPr/>
+      </p:nvGrpSpPr>
+      <p:grpSpPr>
+        <a:xfrm>
+          <a:off x="0" y="0"/>
+          <a:ext cx="0" cy="0"/>
+          <a:chOff x="0" y="0"/>
+          <a:chExt cx="0" cy="0"/>
+        </a:xfrm>
+      </p:grpSpPr>
+      <p:sp>
+        <p:nvSpPr>
+          <p:cNvPr id="2" name="Title 1"/>
+          <p:cNvSpPr>
+            <a:spLocks noGrp="1"/>
+          </p:cNvSpPr>
+          <p:nvPr>
+            <p:ph type="title"/>
+          </p:nvPr>
+        </p:nvSpPr>
+        <p:spPr/>
+        <p:txBody>
+          <a:bodyPr/>
+          <a:lstStyle/>
+          <a:p>
+            <a:r>
+              <a:rPr lang="de-DE" dirty="0"/>
+              <a:t>Vorstellung</a:t>
+            </a:r>
+          </a:p>
+        </p:txBody>
+      </p:sp>
+      <p:sp>
+        <p:nvSpPr>
+          <p:cNvPr id="3" name="Content Placeholder 2"/>
+          <p:cNvSpPr>
+            <a:spLocks noGrp="1"/>
+          </p:cNvSpPr>
+          <p:nvPr>
+            <p:ph idx="1"/>
+          </p:nvPr>
+        </p:nvSpPr>
+        <p:spPr>
+          <a:xfrm>
+            <a:off x="250825" y="1214438"/>
+            <a:ext cx="6556375" cy="3646487"/>
+          </a:xfrm>
+        </p:spPr>
+        <p:txBody>
+          <a:bodyPr/>
+          <a:lstStyle/>
+          <a:p>
+            <a:pPr marL="285750" indent="-285750">
+              <a:buFont typeface="Arial" panose="020B0604020202020204" pitchFamily="34" charset="0"/>
+              <a:buChar char="•"/>
+            </a:pPr>
+            <a:r>
+              <a:rPr lang="de-DE" sz="2400" dirty="0">
+                <a:hlinkClick r:id="rId2"/>
+              </a:rPr>
+              <a:t>FU Link</a:t>
+            </a:r>
+            <a:r>
+              <a:rPr lang="de-DE" sz="2400" dirty="0"/>
+              <a:t> </a:t>
+            </a:r>
+          </a:p>
+          <a:p>
+            <a:pPr marL="285750" indent="-285750">
+              <a:buFont typeface="Arial" panose="020B0604020202020204" pitchFamily="34" charset="0"/>
+              <a:buChar char="•"/>
+            </a:pPr>
+            <a:endParaRPr lang="de-DE" sz="2400" dirty="0"/>
+          </a:p>
+          <a:p>
+            <a:pPr marL="285750" indent="-285750">
+              <a:buFont typeface="Arial" panose="020B0604020202020204" pitchFamily="34" charset="0"/>
+              <a:buChar char="•"/>
+            </a:pPr>
+            <a:r>
+              <a:rPr lang="de-DE" sz="2400" dirty="0"/>
+              <a:t>Sprechstunde: Dienstag 12-14 Uhr </a:t>
+            </a:r>
+            <a:r>
+              <a:rPr lang="en-US" sz="2400" dirty="0" err="1"/>
+              <a:t>Ihnestraße</a:t>
+            </a:r>
+            <a:r>
+              <a:rPr lang="en-US" sz="2400" dirty="0"/>
+              <a:t> </a:t>
+            </a:r>
+            <a:r>
+              <a:rPr lang="de-DE" sz="2400" dirty="0"/>
+              <a:t> 22 – Webex</a:t>
+            </a:r>
+          </a:p>
+          <a:p>
+            <a:pPr marL="285750" indent="-285750">
+              <a:buFont typeface="Arial" panose="020B0604020202020204" pitchFamily="34" charset="0"/>
+              <a:buChar char="•"/>
+            </a:pPr>
+            <a:endParaRPr lang="de-DE" sz="2400" dirty="0"/>
+          </a:p>
+          <a:p>
+            <a:pPr marL="641350" lvl="1" indent="-285750">
+              <a:buFont typeface="Arial" panose="020B0604020202020204" pitchFamily="34" charset="0"/>
+              <a:buChar char="•"/>
+            </a:pPr>
+            <a:r>
+              <a:rPr lang="de-DE" sz="2400" dirty="0"/>
+              <a:t>Bitte vorher einen Termin vereinbaren  </a:t>
+            </a:r>
+            <a:r>
+              <a:rPr lang="de-DE" sz="2400" dirty="0">
+                <a:sym typeface="Wingdings" panose="05000000000000000000" pitchFamily="2" charset="2"/>
+              </a:rPr>
+              <a:t> FU Webseite</a:t>
+            </a:r>
+            <a:endParaRPr lang="de-DE" sz="2400" dirty="0"/>
+          </a:p>
+          <a:p>
+            <a:pPr marL="641350" lvl="1" indent="-285750">
+              <a:buFont typeface="Arial" panose="020B0604020202020204" pitchFamily="34" charset="0"/>
+              <a:buChar char="•"/>
+            </a:pPr>
+            <a:r>
+              <a:rPr lang="de-DE" sz="2400" dirty="0"/>
+              <a:t>Substantive Fragen in der Sprechstunde </a:t>
+            </a:r>
+          </a:p>
+          <a:p>
+            <a:pPr marL="285750" indent="-285750">
+              <a:buFont typeface="Arial" panose="020B0604020202020204" pitchFamily="34" charset="0"/>
+              <a:buChar char="•"/>
+            </a:pPr>
+            <a:endParaRPr lang="de-DE" dirty="0"/>
+          </a:p>
+          <a:p>
+            <a:pPr marL="285750" indent="-285750">
+              <a:buFont typeface="Arial" panose="020B0604020202020204" pitchFamily="34" charset="0"/>
+              <a:buChar char="•"/>
+            </a:pPr>
+            <a:endParaRPr lang="de-DE" dirty="0"/>
+          </a:p>
+        </p:txBody>
+      </p:sp>
+      <p:pic>
+        <p:nvPicPr>
+          <p:cNvPr id="5" name="Picture 4"/>
+          <p:cNvPicPr>
+            <a:picLocks noChangeAspect="1"/>
+          </p:cNvPicPr>
+          <p:nvPr/>
+        </p:nvPicPr>
+        <p:blipFill>
+          <a:blip r:embed="rId3" cstate="print">
+            <a:extLst>
+              <a:ext uri="{28A0092B-C50C-407E-A947-70E740481C1C}">
+                <a14:useLocalDpi xmlns:a14="http://schemas.microsoft.com/office/drawing/2010/main" val="0"/>
+              </a:ext>
+            </a:extLst>
+          </a:blip>
+          <a:stretch>
+            <a:fillRect/>
+          </a:stretch>
+        </p:blipFill>
+        <p:spPr>
+          <a:xfrm>
+            <a:off x="6960044" y="1031875"/>
+            <a:ext cx="1933131" cy="2878453"/>
+          </a:xfrm>
+          <a:prstGeom prst="rect">
+            <a:avLst/>
+          </a:prstGeom>
+        </p:spPr>
+      </p:pic>
+    </p:spTree>
+    <p:extLst>
+      <p:ext uri="{BB962C8B-B14F-4D97-AF65-F5344CB8AC3E}">
+        <p14:creationId xmlns:p14="http://schemas.microsoft.com/office/powerpoint/2010/main" val="3393580242"/>
       </p:ext>
     </p:extLst>
   </p:cSld>

</xml_diff>